<commit_message>
Removed old content and made new data analysis exercise
</commit_message>
<xml_diff>
--- a/Jan 2020/lectures/0_introduction.pptx
+++ b/Jan 2020/lectures/0_introduction.pptx
@@ -202,7 +202,7 @@
           <a:p>
             <a:fld id="{AC3D4C7F-B212-4F5D-A19E-A9A3DDA8A491}" type="datetimeFigureOut">
               <a:rPr lang="en-GB" smtClean="0"/>
-              <a:t>26/12/2019</a:t>
+              <a:t>30/12/2019</a:t>
             </a:fld>
             <a:endParaRPr lang="en-GB"/>
           </a:p>
@@ -361,7 +361,7 @@
           <a:p>
             <a:fld id="{278FE485-5A93-4938-8A2E-359DBEC61172}" type="slidenum">
               <a:rPr lang="en-GB" smtClean="0"/>
-              <a:t>‹nr.›</a:t>
+              <a:t>‹#›</a:t>
             </a:fld>
             <a:endParaRPr lang="en-GB"/>
           </a:p>
@@ -703,7 +703,7 @@
           <a:p>
             <a:fld id="{8CEBC7DE-ED89-46B1-9F84-022BAED37CB2}" type="datetimeFigureOut">
               <a:rPr lang="en-GB" smtClean="0"/>
-              <a:t>26/12/2019</a:t>
+              <a:t>30/12/2019</a:t>
             </a:fld>
             <a:endParaRPr lang="en-GB"/>
           </a:p>
@@ -757,7 +757,7 @@
           <a:p>
             <a:fld id="{A92A5DB9-4B00-44B1-A55B-C2DF72262E0D}" type="slidenum">
               <a:rPr lang="en-GB" smtClean="0"/>
-              <a:t>‹nr.›</a:t>
+              <a:t>‹#›</a:t>
             </a:fld>
             <a:endParaRPr lang="en-GB"/>
           </a:p>
@@ -903,7 +903,7 @@
           <a:p>
             <a:fld id="{8CEBC7DE-ED89-46B1-9F84-022BAED37CB2}" type="datetimeFigureOut">
               <a:rPr lang="en-GB" smtClean="0"/>
-              <a:t>26/12/2019</a:t>
+              <a:t>30/12/2019</a:t>
             </a:fld>
             <a:endParaRPr lang="en-GB"/>
           </a:p>
@@ -957,7 +957,7 @@
           <a:p>
             <a:fld id="{A92A5DB9-4B00-44B1-A55B-C2DF72262E0D}" type="slidenum">
               <a:rPr lang="en-GB" smtClean="0"/>
-              <a:t>‹nr.›</a:t>
+              <a:t>‹#›</a:t>
             </a:fld>
             <a:endParaRPr lang="en-GB"/>
           </a:p>
@@ -1113,7 +1113,7 @@
           <a:p>
             <a:fld id="{8CEBC7DE-ED89-46B1-9F84-022BAED37CB2}" type="datetimeFigureOut">
               <a:rPr lang="en-GB" smtClean="0"/>
-              <a:t>26/12/2019</a:t>
+              <a:t>30/12/2019</a:t>
             </a:fld>
             <a:endParaRPr lang="en-GB"/>
           </a:p>
@@ -1167,7 +1167,7 @@
           <a:p>
             <a:fld id="{A92A5DB9-4B00-44B1-A55B-C2DF72262E0D}" type="slidenum">
               <a:rPr lang="en-GB" smtClean="0"/>
-              <a:t>‹nr.›</a:t>
+              <a:t>‹#›</a:t>
             </a:fld>
             <a:endParaRPr lang="en-GB"/>
           </a:p>
@@ -1313,7 +1313,7 @@
           <a:p>
             <a:fld id="{8CEBC7DE-ED89-46B1-9F84-022BAED37CB2}" type="datetimeFigureOut">
               <a:rPr lang="en-GB" smtClean="0"/>
-              <a:t>26/12/2019</a:t>
+              <a:t>30/12/2019</a:t>
             </a:fld>
             <a:endParaRPr lang="en-GB"/>
           </a:p>
@@ -1367,7 +1367,7 @@
           <a:p>
             <a:fld id="{A92A5DB9-4B00-44B1-A55B-C2DF72262E0D}" type="slidenum">
               <a:rPr lang="en-GB" smtClean="0"/>
-              <a:t>‹nr.›</a:t>
+              <a:t>‹#›</a:t>
             </a:fld>
             <a:endParaRPr lang="en-GB"/>
           </a:p>
@@ -1589,7 +1589,7 @@
           <a:p>
             <a:fld id="{8CEBC7DE-ED89-46B1-9F84-022BAED37CB2}" type="datetimeFigureOut">
               <a:rPr lang="en-GB" smtClean="0"/>
-              <a:t>26/12/2019</a:t>
+              <a:t>30/12/2019</a:t>
             </a:fld>
             <a:endParaRPr lang="en-GB"/>
           </a:p>
@@ -1643,7 +1643,7 @@
           <a:p>
             <a:fld id="{A92A5DB9-4B00-44B1-A55B-C2DF72262E0D}" type="slidenum">
               <a:rPr lang="en-GB" smtClean="0"/>
-              <a:t>‹nr.›</a:t>
+              <a:t>‹#›</a:t>
             </a:fld>
             <a:endParaRPr lang="en-GB"/>
           </a:p>
@@ -1857,7 +1857,7 @@
           <a:p>
             <a:fld id="{8CEBC7DE-ED89-46B1-9F84-022BAED37CB2}" type="datetimeFigureOut">
               <a:rPr lang="en-GB" smtClean="0"/>
-              <a:t>26/12/2019</a:t>
+              <a:t>30/12/2019</a:t>
             </a:fld>
             <a:endParaRPr lang="en-GB"/>
           </a:p>
@@ -1911,7 +1911,7 @@
           <a:p>
             <a:fld id="{A92A5DB9-4B00-44B1-A55B-C2DF72262E0D}" type="slidenum">
               <a:rPr lang="en-GB" smtClean="0"/>
-              <a:t>‹nr.›</a:t>
+              <a:t>‹#›</a:t>
             </a:fld>
             <a:endParaRPr lang="en-GB"/>
           </a:p>
@@ -2272,7 +2272,7 @@
           <a:p>
             <a:fld id="{8CEBC7DE-ED89-46B1-9F84-022BAED37CB2}" type="datetimeFigureOut">
               <a:rPr lang="en-GB" smtClean="0"/>
-              <a:t>26/12/2019</a:t>
+              <a:t>30/12/2019</a:t>
             </a:fld>
             <a:endParaRPr lang="en-GB"/>
           </a:p>
@@ -2326,7 +2326,7 @@
           <a:p>
             <a:fld id="{A92A5DB9-4B00-44B1-A55B-C2DF72262E0D}" type="slidenum">
               <a:rPr lang="en-GB" smtClean="0"/>
-              <a:t>‹nr.›</a:t>
+              <a:t>‹#›</a:t>
             </a:fld>
             <a:endParaRPr lang="en-GB"/>
           </a:p>
@@ -2414,7 +2414,7 @@
           <a:p>
             <a:fld id="{8CEBC7DE-ED89-46B1-9F84-022BAED37CB2}" type="datetimeFigureOut">
               <a:rPr lang="en-GB" smtClean="0"/>
-              <a:t>26/12/2019</a:t>
+              <a:t>30/12/2019</a:t>
             </a:fld>
             <a:endParaRPr lang="en-GB"/>
           </a:p>
@@ -2468,7 +2468,7 @@
           <a:p>
             <a:fld id="{A92A5DB9-4B00-44B1-A55B-C2DF72262E0D}" type="slidenum">
               <a:rPr lang="en-GB" smtClean="0"/>
-              <a:t>‹nr.›</a:t>
+              <a:t>‹#›</a:t>
             </a:fld>
             <a:endParaRPr lang="en-GB"/>
           </a:p>
@@ -2527,7 +2527,7 @@
           <a:p>
             <a:fld id="{8CEBC7DE-ED89-46B1-9F84-022BAED37CB2}" type="datetimeFigureOut">
               <a:rPr lang="en-GB" smtClean="0"/>
-              <a:t>26/12/2019</a:t>
+              <a:t>30/12/2019</a:t>
             </a:fld>
             <a:endParaRPr lang="en-GB"/>
           </a:p>
@@ -2581,7 +2581,7 @@
           <a:p>
             <a:fld id="{A92A5DB9-4B00-44B1-A55B-C2DF72262E0D}" type="slidenum">
               <a:rPr lang="en-GB" smtClean="0"/>
-              <a:t>‹nr.›</a:t>
+              <a:t>‹#›</a:t>
             </a:fld>
             <a:endParaRPr lang="en-GB"/>
           </a:p>
@@ -2840,7 +2840,7 @@
           <a:p>
             <a:fld id="{8CEBC7DE-ED89-46B1-9F84-022BAED37CB2}" type="datetimeFigureOut">
               <a:rPr lang="en-GB" smtClean="0"/>
-              <a:t>26/12/2019</a:t>
+              <a:t>30/12/2019</a:t>
             </a:fld>
             <a:endParaRPr lang="en-GB"/>
           </a:p>
@@ -2894,7 +2894,7 @@
           <a:p>
             <a:fld id="{A92A5DB9-4B00-44B1-A55B-C2DF72262E0D}" type="slidenum">
               <a:rPr lang="en-GB" smtClean="0"/>
-              <a:t>‹nr.›</a:t>
+              <a:t>‹#›</a:t>
             </a:fld>
             <a:endParaRPr lang="en-GB"/>
           </a:p>
@@ -3129,7 +3129,7 @@
           <a:p>
             <a:fld id="{8CEBC7DE-ED89-46B1-9F84-022BAED37CB2}" type="datetimeFigureOut">
               <a:rPr lang="en-GB" smtClean="0"/>
-              <a:t>26/12/2019</a:t>
+              <a:t>30/12/2019</a:t>
             </a:fld>
             <a:endParaRPr lang="en-GB"/>
           </a:p>
@@ -3183,7 +3183,7 @@
           <a:p>
             <a:fld id="{A92A5DB9-4B00-44B1-A55B-C2DF72262E0D}" type="slidenum">
               <a:rPr lang="en-GB" smtClean="0"/>
-              <a:t>‹nr.›</a:t>
+              <a:t>‹#›</a:t>
             </a:fld>
             <a:endParaRPr lang="en-GB"/>
           </a:p>
@@ -3372,7 +3372,7 @@
           <a:p>
             <a:fld id="{8CEBC7DE-ED89-46B1-9F84-022BAED37CB2}" type="datetimeFigureOut">
               <a:rPr lang="en-GB" smtClean="0"/>
-              <a:t>26/12/2019</a:t>
+              <a:t>30/12/2019</a:t>
             </a:fld>
             <a:endParaRPr lang="en-GB"/>
           </a:p>
@@ -3462,7 +3462,7 @@
           <a:p>
             <a:fld id="{A92A5DB9-4B00-44B1-A55B-C2DF72262E0D}" type="slidenum">
               <a:rPr lang="en-GB" smtClean="0"/>
-              <a:t>‹nr.›</a:t>
+              <a:t>‹#›</a:t>
             </a:fld>
             <a:endParaRPr lang="en-GB"/>
           </a:p>
@@ -4149,10 +4149,13 @@
         </p:spPr>
         <p:txBody>
           <a:bodyPr numCol="2">
-            <a:normAutofit fontScale="85000" lnSpcReduction="20000"/>
+            <a:normAutofit fontScale="92500" lnSpcReduction="20000"/>
           </a:bodyPr>
           <a:lstStyle/>
           <a:p>
+            <a:pPr marL="0" indent="0">
+              <a:buNone/>
+            </a:pPr>
             <a:r>
               <a:rPr lang="en-GB" b="1" dirty="0"/>
               <a:t>Session 1 (13 January)</a:t>
@@ -4162,13 +4165,13 @@
           <a:p>
             <a:r>
               <a:rPr lang="en-GB" dirty="0"/>
-              <a:t>9:30 – 10:30 Introduction to computer science</a:t>
+              <a:t>13:00 – 14:00 Introduction to computer science</a:t>
             </a:r>
           </a:p>
           <a:p>
             <a:r>
               <a:rPr lang="en-GB" dirty="0"/>
-              <a:t>10:30 – 12:00</a:t>
+              <a:t>14:00 – 16:00</a:t>
             </a:r>
             <a:r>
               <a:rPr lang="en-GB" b="1" dirty="0"/>
@@ -4180,13 +4183,15 @@
             </a:r>
           </a:p>
           <a:p>
-            <a:r>
-              <a:rPr lang="en-GB" b="1" dirty="0"/>
-              <a:t> </a:t>
-            </a:r>
+            <a:pPr marL="0" indent="0">
+              <a:buNone/>
+            </a:pPr>
             <a:endParaRPr lang="en-GB" dirty="0"/>
           </a:p>
           <a:p>
+            <a:pPr marL="0" indent="0">
+              <a:buNone/>
+            </a:pPr>
             <a:r>
               <a:rPr lang="en-GB" b="1" dirty="0"/>
               <a:t>Session 2 (16 January)</a:t>
@@ -4195,13 +4200,7 @@
           <a:p>
             <a:r>
               <a:rPr lang="en-GB" dirty="0"/>
-              <a:t>Discuss last weeks exercises – do live coding of part 3 and any other exercises they found hard</a:t>
-            </a:r>
-          </a:p>
-          <a:p>
-            <a:r>
-              <a:rPr lang="en-GB" dirty="0"/>
-              <a:t>13:00 – 14:00 Introduction to modules and </a:t>
+              <a:t>13:00 – 15:15 Introduction to modules and </a:t>
             </a:r>
             <a:r>
               <a:rPr lang="en-GB" dirty="0" err="1"/>
@@ -4210,36 +4209,48 @@
             <a:endParaRPr lang="en-GB" dirty="0"/>
           </a:p>
           <a:p>
+            <a:r>
+              <a:rPr lang="en-GB" dirty="0"/>
+              <a:t>15:15 – 16:00 Data analysis in Python</a:t>
+            </a:r>
+          </a:p>
+          <a:p>
+            <a:pPr marL="0" indent="0">
+              <a:buNone/>
+            </a:pPr>
+            <a:endParaRPr lang="en-GB" b="1" dirty="0"/>
+          </a:p>
+          <a:p>
+            <a:pPr marL="0" indent="0">
+              <a:buNone/>
+            </a:pPr>
+            <a:r>
+              <a:rPr lang="en-GB" b="1" dirty="0"/>
+              <a:t>Session 3 (20 January)</a:t>
+            </a:r>
+          </a:p>
+          <a:p>
+            <a:r>
+              <a:rPr lang="en-GB" dirty="0"/>
+              <a:t>13:00 – 15:00 Introduction to data visualization with Matplotlib</a:t>
+            </a:r>
+          </a:p>
+          <a:p>
+            <a:r>
+              <a:rPr lang="en-GB" dirty="0"/>
+              <a:t>15:00 – 16:00 Good coding practices</a:t>
+            </a:r>
+          </a:p>
+          <a:p>
             <a:pPr marL="0" indent="0">
               <a:buNone/>
             </a:pPr>
             <a:endParaRPr lang="en-GB" dirty="0"/>
           </a:p>
           <a:p>
-            <a:r>
-              <a:rPr lang="en-GB" b="1" dirty="0"/>
-              <a:t>Session 3 (20 January)</a:t>
-            </a:r>
-          </a:p>
-          <a:p>
-            <a:r>
-              <a:rPr lang="en-GB" dirty="0"/>
-              <a:t>11:30 – 12:30 Good coding practices</a:t>
-            </a:r>
-          </a:p>
-          <a:p>
-            <a:r>
-              <a:rPr lang="en-GB" dirty="0"/>
-              <a:t>15:30 – 17:00 Introduction to data visualization with Matplotlib</a:t>
-            </a:r>
-          </a:p>
-          <a:p>
-            <a:r>
-              <a:rPr lang="en-GB" dirty="0"/>
-              <a:t> </a:t>
-            </a:r>
-          </a:p>
-          <a:p>
+            <a:pPr marL="0" indent="0">
+              <a:buNone/>
+            </a:pPr>
             <a:r>
               <a:rPr lang="en-GB" b="1" dirty="0"/>
               <a:t>Session 4 (23 January)</a:t>
@@ -4248,27 +4259,13 @@
           <a:p>
             <a:r>
               <a:rPr lang="en-GB" dirty="0"/>
-              <a:t>9:30 – 11:30 Data analysis with Python </a:t>
-            </a:r>
-          </a:p>
-          <a:p>
-            <a:pPr lvl="1"/>
+              <a:t>13:00 – 14:00 Discuss good coding practices exercise + general questions</a:t>
+            </a:r>
+          </a:p>
+          <a:p>
             <a:r>
               <a:rPr lang="en-GB" dirty="0"/>
-              <a:t>Loading/saving data</a:t>
-            </a:r>
-          </a:p>
-          <a:p>
-            <a:pPr lvl="1"/>
-            <a:r>
-              <a:rPr lang="en-GB" dirty="0"/>
-              <a:t>Live coding of how I would attack a project</a:t>
-            </a:r>
-          </a:p>
-          <a:p>
-            <a:r>
-              <a:rPr lang="en-GB" dirty="0"/>
-              <a:t>13:30 – 16:00 Discussion + project work</a:t>
+              <a:t>14:00 – 16:00 Python project work</a:t>
             </a:r>
           </a:p>
           <a:p>

</xml_diff>

<commit_message>
Little fixed to intro
</commit_message>
<xml_diff>
--- a/Jan 2020/lectures/0_introduction.pptx
+++ b/Jan 2020/lectures/0_introduction.pptx
@@ -5,7 +5,7 @@
     <p:sldMasterId id="2147483648" r:id="rId1"/>
   </p:sldMasterIdLst>
   <p:notesMasterIdLst>
-    <p:notesMasterId r:id="rId8"/>
+    <p:notesMasterId r:id="rId9"/>
   </p:notesMasterIdLst>
   <p:sldIdLst>
     <p:sldId id="258" r:id="rId2"/>
@@ -13,7 +13,8 @@
     <p:sldId id="260" r:id="rId4"/>
     <p:sldId id="262" r:id="rId5"/>
     <p:sldId id="264" r:id="rId6"/>
-    <p:sldId id="265" r:id="rId7"/>
+    <p:sldId id="266" r:id="rId7"/>
+    <p:sldId id="265" r:id="rId8"/>
   </p:sldIdLst>
   <p:sldSz cx="12192000" cy="6858000"/>
   <p:notesSz cx="6858000" cy="9144000"/>
@@ -202,7 +203,7 @@
           <a:p>
             <a:fld id="{AC3D4C7F-B212-4F5D-A19E-A9A3DDA8A491}" type="datetimeFigureOut">
               <a:rPr lang="en-GB" smtClean="0"/>
-              <a:t>30/12/2019</a:t>
+              <a:t>13/01/2020</a:t>
             </a:fld>
             <a:endParaRPr lang="en-GB"/>
           </a:p>
@@ -703,7 +704,7 @@
           <a:p>
             <a:fld id="{8CEBC7DE-ED89-46B1-9F84-022BAED37CB2}" type="datetimeFigureOut">
               <a:rPr lang="en-GB" smtClean="0"/>
-              <a:t>30/12/2019</a:t>
+              <a:t>13/01/2020</a:t>
             </a:fld>
             <a:endParaRPr lang="en-GB"/>
           </a:p>
@@ -903,7 +904,7 @@
           <a:p>
             <a:fld id="{8CEBC7DE-ED89-46B1-9F84-022BAED37CB2}" type="datetimeFigureOut">
               <a:rPr lang="en-GB" smtClean="0"/>
-              <a:t>30/12/2019</a:t>
+              <a:t>13/01/2020</a:t>
             </a:fld>
             <a:endParaRPr lang="en-GB"/>
           </a:p>
@@ -1113,7 +1114,7 @@
           <a:p>
             <a:fld id="{8CEBC7DE-ED89-46B1-9F84-022BAED37CB2}" type="datetimeFigureOut">
               <a:rPr lang="en-GB" smtClean="0"/>
-              <a:t>30/12/2019</a:t>
+              <a:t>13/01/2020</a:t>
             </a:fld>
             <a:endParaRPr lang="en-GB"/>
           </a:p>
@@ -1313,7 +1314,7 @@
           <a:p>
             <a:fld id="{8CEBC7DE-ED89-46B1-9F84-022BAED37CB2}" type="datetimeFigureOut">
               <a:rPr lang="en-GB" smtClean="0"/>
-              <a:t>30/12/2019</a:t>
+              <a:t>13/01/2020</a:t>
             </a:fld>
             <a:endParaRPr lang="en-GB"/>
           </a:p>
@@ -1589,7 +1590,7 @@
           <a:p>
             <a:fld id="{8CEBC7DE-ED89-46B1-9F84-022BAED37CB2}" type="datetimeFigureOut">
               <a:rPr lang="en-GB" smtClean="0"/>
-              <a:t>30/12/2019</a:t>
+              <a:t>13/01/2020</a:t>
             </a:fld>
             <a:endParaRPr lang="en-GB"/>
           </a:p>
@@ -1857,7 +1858,7 @@
           <a:p>
             <a:fld id="{8CEBC7DE-ED89-46B1-9F84-022BAED37CB2}" type="datetimeFigureOut">
               <a:rPr lang="en-GB" smtClean="0"/>
-              <a:t>30/12/2019</a:t>
+              <a:t>13/01/2020</a:t>
             </a:fld>
             <a:endParaRPr lang="en-GB"/>
           </a:p>
@@ -2272,7 +2273,7 @@
           <a:p>
             <a:fld id="{8CEBC7DE-ED89-46B1-9F84-022BAED37CB2}" type="datetimeFigureOut">
               <a:rPr lang="en-GB" smtClean="0"/>
-              <a:t>30/12/2019</a:t>
+              <a:t>13/01/2020</a:t>
             </a:fld>
             <a:endParaRPr lang="en-GB"/>
           </a:p>
@@ -2414,7 +2415,7 @@
           <a:p>
             <a:fld id="{8CEBC7DE-ED89-46B1-9F84-022BAED37CB2}" type="datetimeFigureOut">
               <a:rPr lang="en-GB" smtClean="0"/>
-              <a:t>30/12/2019</a:t>
+              <a:t>13/01/2020</a:t>
             </a:fld>
             <a:endParaRPr lang="en-GB"/>
           </a:p>
@@ -2527,7 +2528,7 @@
           <a:p>
             <a:fld id="{8CEBC7DE-ED89-46B1-9F84-022BAED37CB2}" type="datetimeFigureOut">
               <a:rPr lang="en-GB" smtClean="0"/>
-              <a:t>30/12/2019</a:t>
+              <a:t>13/01/2020</a:t>
             </a:fld>
             <a:endParaRPr lang="en-GB"/>
           </a:p>
@@ -2840,7 +2841,7 @@
           <a:p>
             <a:fld id="{8CEBC7DE-ED89-46B1-9F84-022BAED37CB2}" type="datetimeFigureOut">
               <a:rPr lang="en-GB" smtClean="0"/>
-              <a:t>30/12/2019</a:t>
+              <a:t>13/01/2020</a:t>
             </a:fld>
             <a:endParaRPr lang="en-GB"/>
           </a:p>
@@ -3129,7 +3130,7 @@
           <a:p>
             <a:fld id="{8CEBC7DE-ED89-46B1-9F84-022BAED37CB2}" type="datetimeFigureOut">
               <a:rPr lang="en-GB" smtClean="0"/>
-              <a:t>30/12/2019</a:t>
+              <a:t>13/01/2020</a:t>
             </a:fld>
             <a:endParaRPr lang="en-GB"/>
           </a:p>
@@ -3372,7 +3373,7 @@
           <a:p>
             <a:fld id="{8CEBC7DE-ED89-46B1-9F84-022BAED37CB2}" type="datetimeFigureOut">
               <a:rPr lang="en-GB" smtClean="0"/>
-              <a:t>30/12/2019</a:t>
+              <a:t>13/01/2020</a:t>
             </a:fld>
             <a:endParaRPr lang="en-GB"/>
           </a:p>
@@ -4433,6 +4434,115 @@
           <p:cNvPr id="2" name="Title 1">
             <a:extLst>
               <a:ext uri="{FF2B5EF4-FFF2-40B4-BE49-F238E27FC236}">
+                <a16:creationId xmlns:a16="http://schemas.microsoft.com/office/drawing/2014/main" id="{A5BC3377-D007-4F90-9883-A2B8A08878D3}"/>
+              </a:ext>
+            </a:extLst>
+          </p:cNvPr>
+          <p:cNvSpPr>
+            <a:spLocks noGrp="1"/>
+          </p:cNvSpPr>
+          <p:nvPr>
+            <p:ph type="title"/>
+          </p:nvPr>
+        </p:nvSpPr>
+        <p:spPr/>
+        <p:txBody>
+          <a:bodyPr/>
+          <a:lstStyle/>
+          <a:p>
+            <a:r>
+              <a:rPr lang="en-GB" dirty="0"/>
+              <a:t>Pair programming</a:t>
+            </a:r>
+          </a:p>
+        </p:txBody>
+      </p:sp>
+      <p:sp>
+        <p:nvSpPr>
+          <p:cNvPr id="3" name="Content Placeholder 2">
+            <a:extLst>
+              <a:ext uri="{FF2B5EF4-FFF2-40B4-BE49-F238E27FC236}">
+                <a16:creationId xmlns:a16="http://schemas.microsoft.com/office/drawing/2014/main" id="{9071E597-96CF-4E8D-A92C-DE74243D56B2}"/>
+              </a:ext>
+            </a:extLst>
+          </p:cNvPr>
+          <p:cNvSpPr>
+            <a:spLocks noGrp="1"/>
+          </p:cNvSpPr>
+          <p:nvPr>
+            <p:ph sz="half" idx="1"/>
+          </p:nvPr>
+        </p:nvSpPr>
+        <p:spPr>
+          <a:xfrm>
+            <a:off x="838199" y="1825625"/>
+            <a:ext cx="10373139" cy="4351338"/>
+          </a:xfrm>
+        </p:spPr>
+        <p:txBody>
+          <a:bodyPr/>
+          <a:lstStyle/>
+          <a:p>
+            <a:r>
+              <a:rPr lang="en-GB" dirty="0"/>
+              <a:t>Pair up in twos</a:t>
+            </a:r>
+          </a:p>
+          <a:p>
+            <a:r>
+              <a:rPr lang="en-GB" dirty="0"/>
+              <a:t>One person actively typing (driver)</a:t>
+            </a:r>
+          </a:p>
+          <a:p>
+            <a:r>
+              <a:rPr lang="en-GB" dirty="0"/>
+              <a:t>Other person gives input and checks code (navigator)</a:t>
+            </a:r>
+          </a:p>
+          <a:p>
+            <a:r>
+              <a:rPr lang="en-GB" dirty="0"/>
+              <a:t>Switch frequently</a:t>
+            </a:r>
+          </a:p>
+        </p:txBody>
+      </p:sp>
+    </p:spTree>
+    <p:extLst>
+      <p:ext uri="{BB962C8B-B14F-4D97-AF65-F5344CB8AC3E}">
+        <p14:creationId xmlns:p14="http://schemas.microsoft.com/office/powerpoint/2010/main" val="1312648616"/>
+      </p:ext>
+    </p:extLst>
+  </p:cSld>
+  <p:clrMapOvr>
+    <a:masterClrMapping/>
+  </p:clrMapOvr>
+</p:sld>
+</file>
+
+<file path=ppt/slides/slide7.xml><?xml version="1.0" encoding="utf-8"?>
+<p:sld xmlns:a="http://schemas.openxmlformats.org/drawingml/2006/main" xmlns:r="http://schemas.openxmlformats.org/officeDocument/2006/relationships" xmlns:p="http://schemas.openxmlformats.org/presentationml/2006/main">
+  <p:cSld>
+    <p:spTree>
+      <p:nvGrpSpPr>
+        <p:cNvPr id="1" name=""/>
+        <p:cNvGrpSpPr/>
+        <p:nvPr/>
+      </p:nvGrpSpPr>
+      <p:grpSpPr>
+        <a:xfrm>
+          <a:off x="0" y="0"/>
+          <a:ext cx="0" cy="0"/>
+          <a:chOff x="0" y="0"/>
+          <a:chExt cx="0" cy="0"/>
+        </a:xfrm>
+      </p:grpSpPr>
+      <p:sp>
+        <p:nvSpPr>
+          <p:cNvPr id="2" name="Title 1">
+            <a:extLst>
+              <a:ext uri="{FF2B5EF4-FFF2-40B4-BE49-F238E27FC236}">
                 <a16:creationId xmlns:a16="http://schemas.microsoft.com/office/drawing/2014/main" id="{8020ECCF-8EE6-4768-AC90-5E36CC4C283B}"/>
               </a:ext>
             </a:extLst>
@@ -4451,7 +4561,7 @@
           <a:p>
             <a:r>
               <a:rPr lang="en-GB" dirty="0"/>
-              <a:t>Rules for course</a:t>
+              <a:t>‘Rules’ for course</a:t>
             </a:r>
           </a:p>
         </p:txBody>

</xml_diff>

<commit_message>
Added filled in lesson 2
</commit_message>
<xml_diff>
--- a/Jan 2020/lectures/0_introduction.pptx
+++ b/Jan 2020/lectures/0_introduction.pptx
@@ -5,7 +5,7 @@
     <p:sldMasterId id="2147483648" r:id="rId1"/>
   </p:sldMasterIdLst>
   <p:notesMasterIdLst>
-    <p:notesMasterId r:id="rId9"/>
+    <p:notesMasterId r:id="rId10"/>
   </p:notesMasterIdLst>
   <p:sldIdLst>
     <p:sldId id="258" r:id="rId2"/>
@@ -15,6 +15,7 @@
     <p:sldId id="264" r:id="rId6"/>
     <p:sldId id="266" r:id="rId7"/>
     <p:sldId id="265" r:id="rId8"/>
+    <p:sldId id="267" r:id="rId9"/>
   </p:sldIdLst>
   <p:sldSz cx="12192000" cy="6858000"/>
   <p:notesSz cx="6858000" cy="9144000"/>
@@ -4561,7 +4562,7 @@
           <a:p>
             <a:r>
               <a:rPr lang="en-GB" dirty="0"/>
-              <a:t>‘Rules’ for course</a:t>
+              <a:t>During the course</a:t>
             </a:r>
           </a:p>
         </p:txBody>
@@ -4612,12 +4613,189 @@
           <a:p>
             <a:endParaRPr lang="en-GB" dirty="0"/>
           </a:p>
+          <a:p>
+            <a:r>
+              <a:rPr lang="en-GB" dirty="0"/>
+              <a:t>Coffee and tea in the back</a:t>
+            </a:r>
+          </a:p>
+          <a:p>
+            <a:r>
+              <a:rPr lang="en-GB" dirty="0"/>
+              <a:t>Water fountain just outside</a:t>
+            </a:r>
+          </a:p>
+          <a:p>
+            <a:r>
+              <a:rPr lang="en-GB" dirty="0"/>
+              <a:t>Toilets outside the door to the right, follow signs</a:t>
+            </a:r>
+          </a:p>
+          <a:p>
+            <a:endParaRPr lang="en-GB" dirty="0"/>
+          </a:p>
+          <a:p>
+            <a:endParaRPr lang="en-GB" dirty="0"/>
+          </a:p>
         </p:txBody>
       </p:sp>
     </p:spTree>
     <p:extLst>
       <p:ext uri="{BB962C8B-B14F-4D97-AF65-F5344CB8AC3E}">
         <p14:creationId xmlns:p14="http://schemas.microsoft.com/office/powerpoint/2010/main" val="608699558"/>
+      </p:ext>
+    </p:extLst>
+  </p:cSld>
+  <p:clrMapOvr>
+    <a:masterClrMapping/>
+  </p:clrMapOvr>
+</p:sld>
+</file>
+
+<file path=ppt/slides/slide8.xml><?xml version="1.0" encoding="utf-8"?>
+<p:sld xmlns:a="http://schemas.openxmlformats.org/drawingml/2006/main" xmlns:r="http://schemas.openxmlformats.org/officeDocument/2006/relationships" xmlns:p="http://schemas.openxmlformats.org/presentationml/2006/main">
+  <p:cSld>
+    <p:spTree>
+      <p:nvGrpSpPr>
+        <p:cNvPr id="1" name=""/>
+        <p:cNvGrpSpPr/>
+        <p:nvPr/>
+      </p:nvGrpSpPr>
+      <p:grpSpPr>
+        <a:xfrm>
+          <a:off x="0" y="0"/>
+          <a:ext cx="0" cy="0"/>
+          <a:chOff x="0" y="0"/>
+          <a:chExt cx="0" cy="0"/>
+        </a:xfrm>
+      </p:grpSpPr>
+      <p:sp>
+        <p:nvSpPr>
+          <p:cNvPr id="2" name="Title 1">
+            <a:extLst>
+              <a:ext uri="{FF2B5EF4-FFF2-40B4-BE49-F238E27FC236}">
+                <a16:creationId xmlns:a16="http://schemas.microsoft.com/office/drawing/2014/main" id="{AD27248D-6658-40E8-857E-346989B287BD}"/>
+              </a:ext>
+            </a:extLst>
+          </p:cNvPr>
+          <p:cNvSpPr>
+            <a:spLocks noGrp="1"/>
+          </p:cNvSpPr>
+          <p:nvPr>
+            <p:ph type="title"/>
+          </p:nvPr>
+        </p:nvSpPr>
+        <p:spPr/>
+        <p:txBody>
+          <a:bodyPr/>
+          <a:lstStyle/>
+          <a:p>
+            <a:r>
+              <a:rPr lang="en-GB" dirty="0"/>
+              <a:t>Before we begin… </a:t>
+            </a:r>
+          </a:p>
+        </p:txBody>
+      </p:sp>
+      <p:sp>
+        <p:nvSpPr>
+          <p:cNvPr id="3" name="Content Placeholder 2">
+            <a:extLst>
+              <a:ext uri="{FF2B5EF4-FFF2-40B4-BE49-F238E27FC236}">
+                <a16:creationId xmlns:a16="http://schemas.microsoft.com/office/drawing/2014/main" id="{A546338B-FD1C-40CC-8BA2-D327C5152873}"/>
+              </a:ext>
+            </a:extLst>
+          </p:cNvPr>
+          <p:cNvSpPr>
+            <a:spLocks noGrp="1"/>
+          </p:cNvSpPr>
+          <p:nvPr>
+            <p:ph sz="half" idx="1"/>
+          </p:nvPr>
+        </p:nvSpPr>
+        <p:spPr>
+          <a:xfrm>
+            <a:off x="838199" y="1825625"/>
+            <a:ext cx="10373139" cy="4351338"/>
+          </a:xfrm>
+        </p:spPr>
+        <p:txBody>
+          <a:bodyPr/>
+          <a:lstStyle/>
+          <a:p>
+            <a:r>
+              <a:rPr lang="en-GB" dirty="0"/>
+              <a:t>Why are you learning Python?</a:t>
+            </a:r>
+          </a:p>
+          <a:p>
+            <a:pPr lvl="1"/>
+            <a:r>
+              <a:rPr lang="en-GB" dirty="0"/>
+              <a:t>Use for research</a:t>
+            </a:r>
+          </a:p>
+          <a:p>
+            <a:pPr lvl="1"/>
+            <a:r>
+              <a:rPr lang="en-GB" dirty="0"/>
+              <a:t>Improve chances of a job</a:t>
+            </a:r>
+          </a:p>
+          <a:p>
+            <a:pPr lvl="1"/>
+            <a:r>
+              <a:rPr lang="en-GB" dirty="0"/>
+              <a:t>For fun</a:t>
+            </a:r>
+          </a:p>
+          <a:p>
+            <a:pPr lvl="1"/>
+            <a:r>
+              <a:rPr lang="en-GB" dirty="0"/>
+              <a:t>Other reason</a:t>
+            </a:r>
+          </a:p>
+          <a:p>
+            <a:r>
+              <a:rPr lang="en-GB" dirty="0"/>
+              <a:t>Can you code in another language?</a:t>
+            </a:r>
+          </a:p>
+          <a:p>
+            <a:pPr lvl="1"/>
+            <a:r>
+              <a:rPr lang="en-GB" dirty="0"/>
+              <a:t>Yes, MATLAB</a:t>
+            </a:r>
+          </a:p>
+          <a:p>
+            <a:pPr lvl="1"/>
+            <a:r>
+              <a:rPr lang="en-GB" dirty="0"/>
+              <a:t>Yes, R</a:t>
+            </a:r>
+          </a:p>
+          <a:p>
+            <a:pPr lvl="1"/>
+            <a:r>
+              <a:rPr lang="en-GB" dirty="0"/>
+              <a:t>Yes, other…</a:t>
+            </a:r>
+          </a:p>
+          <a:p>
+            <a:pPr lvl="1"/>
+            <a:r>
+              <a:rPr lang="en-GB" dirty="0"/>
+              <a:t>No</a:t>
+            </a:r>
+          </a:p>
+        </p:txBody>
+      </p:sp>
+    </p:spTree>
+    <p:extLst>
+      <p:ext uri="{BB962C8B-B14F-4D97-AF65-F5344CB8AC3E}">
+        <p14:creationId xmlns:p14="http://schemas.microsoft.com/office/powerpoint/2010/main" val="619546857"/>
       </p:ext>
     </p:extLst>
   </p:cSld>

</xml_diff>